<commit_message>
chore(samples): refresh proposal pptx with meiryo ui
</commit_message>
<xml_diff>
--- a/samples/gen/proposal.pptx
+++ b/samples/gen/proposal.pptx
@@ -306,7 +306,7 @@
                 <a:solidFill>
                   <a:srgbClr val="333333"/>
                 </a:solidFill>
-                <a:latin typeface="Yu Gothic"/>
+                <a:latin typeface="Meiryo UI"/>
               </a:defRPr>
             </a:pPr>
           </a:p>
@@ -337,7 +337,7 @@
                 <a:solidFill>
                   <a:srgbClr val="333333"/>
                 </a:solidFill>
-                <a:latin typeface="Yu Gothic"/>
+                <a:latin typeface="Meiryo UI"/>
               </a:defRPr>
             </a:pPr>
           </a:p>
@@ -14714,7 +14714,7 @@
                 <a:solidFill>
                   <a:srgbClr val="1A1A1A"/>
                 </a:solidFill>
-                <a:latin typeface="Yu Gothic"/>
+                <a:latin typeface="Meiryo UI"/>
               </a:defRPr>
             </a:pPr>
             <a:r>
@@ -14743,7 +14743,7 @@
                 <a:solidFill>
                   <a:srgbClr val="333333"/>
                 </a:solidFill>
-                <a:latin typeface="Yu Gothic"/>
+                <a:latin typeface="Meiryo UI"/>
               </a:defRPr>
             </a:pPr>
             <a:r>
@@ -14782,7 +14782,7 @@
                 <a:solidFill>
                   <a:srgbClr val="333333"/>
                 </a:solidFill>
-                <a:latin typeface="Yu Gothic"/>
+                <a:latin typeface="Meiryo UI"/>
               </a:defRPr>
             </a:pPr>
             <a:r>
@@ -14798,7 +14798,7 @@
                 <a:solidFill>
                   <a:srgbClr val="333333"/>
                 </a:solidFill>
-                <a:latin typeface="Yu Gothic"/>
+                <a:latin typeface="Meiryo UI"/>
               </a:defRPr>
             </a:pPr>
             <a:r>
@@ -14814,7 +14814,7 @@
                 <a:solidFill>
                   <a:srgbClr val="333333"/>
                 </a:solidFill>
-                <a:latin typeface="Yu Gothic"/>
+                <a:latin typeface="Meiryo UI"/>
               </a:defRPr>
             </a:pPr>
             <a:r>
@@ -14885,7 +14885,7 @@
                 <a:solidFill>
                   <a:srgbClr val="1A1A1A"/>
                 </a:solidFill>
-                <a:latin typeface="Yu Gothic"/>
+                <a:latin typeface="Meiryo UI"/>
               </a:defRPr>
             </a:pPr>
             <a:r>
@@ -14914,7 +14914,7 @@
                 <a:solidFill>
                   <a:srgbClr val="333333"/>
                 </a:solidFill>
-                <a:latin typeface="Yu Gothic"/>
+                <a:latin typeface="Meiryo UI"/>
               </a:defRPr>
             </a:pPr>
             <a:r>
@@ -14953,7 +14953,7 @@
                 <a:solidFill>
                   <a:srgbClr val="333333"/>
                 </a:solidFill>
-                <a:latin typeface="Yu Gothic"/>
+                <a:latin typeface="Meiryo UI"/>
               </a:defRPr>
             </a:pPr>
             <a:r>
@@ -15000,7 +15000,7 @@
                 <a:solidFill>
                   <a:srgbClr val="1A1A1A"/>
                 </a:solidFill>
-                <a:latin typeface="Yu Gothic"/>
+                <a:latin typeface="Meiryo UI"/>
               </a:defRPr>
             </a:pPr>
             <a:r>
@@ -15029,7 +15029,7 @@
                 <a:solidFill>
                   <a:srgbClr val="333333"/>
                 </a:solidFill>
-                <a:latin typeface="Yu Gothic"/>
+                <a:latin typeface="Meiryo UI"/>
               </a:defRPr>
             </a:pPr>
             <a:r>
@@ -15068,7 +15068,7 @@
                 <a:solidFill>
                   <a:srgbClr val="333333"/>
                 </a:solidFill>
-                <a:latin typeface="Yu Gothic"/>
+                <a:latin typeface="Meiryo UI"/>
               </a:defRPr>
             </a:pPr>
             <a:r>
@@ -15110,7 +15110,7 @@
                           <a:solidFill>
                             <a:srgbClr val="FFFFFF"/>
                           </a:solidFill>
-                          <a:latin typeface="Yu Gothic"/>
+                          <a:latin typeface="Meiryo UI"/>
                         </a:defRPr>
                       </a:pPr>
                       <a:r>
@@ -15134,7 +15134,7 @@
                           <a:solidFill>
                             <a:srgbClr val="FFFFFF"/>
                           </a:solidFill>
-                          <a:latin typeface="Yu Gothic"/>
+                          <a:latin typeface="Meiryo UI"/>
                         </a:defRPr>
                       </a:pPr>
                       <a:r>
@@ -15160,7 +15160,7 @@
                           <a:solidFill>
                             <a:srgbClr val="333333"/>
                           </a:solidFill>
-                          <a:latin typeface="Yu Gothic"/>
+                          <a:latin typeface="Meiryo UI"/>
                         </a:defRPr>
                       </a:pPr>
                       <a:r>
@@ -15184,7 +15184,7 @@
                           <a:solidFill>
                             <a:srgbClr val="333333"/>
                           </a:solidFill>
-                          <a:latin typeface="Yu Gothic"/>
+                          <a:latin typeface="Meiryo UI"/>
                         </a:defRPr>
                       </a:pPr>
                       <a:r>
@@ -15210,7 +15210,7 @@
                           <a:solidFill>
                             <a:srgbClr val="333333"/>
                           </a:solidFill>
-                          <a:latin typeface="Yu Gothic"/>
+                          <a:latin typeface="Meiryo UI"/>
                         </a:defRPr>
                       </a:pPr>
                       <a:r>
@@ -15234,7 +15234,7 @@
                           <a:solidFill>
                             <a:srgbClr val="333333"/>
                           </a:solidFill>
-                          <a:latin typeface="Yu Gothic"/>
+                          <a:latin typeface="Meiryo UI"/>
                         </a:defRPr>
                       </a:pPr>
                       <a:r>
@@ -15260,7 +15260,7 @@
                           <a:solidFill>
                             <a:srgbClr val="333333"/>
                           </a:solidFill>
-                          <a:latin typeface="Yu Gothic"/>
+                          <a:latin typeface="Meiryo UI"/>
                         </a:defRPr>
                       </a:pPr>
                       <a:r>
@@ -15284,7 +15284,7 @@
                           <a:solidFill>
                             <a:srgbClr val="333333"/>
                           </a:solidFill>
-                          <a:latin typeface="Yu Gothic"/>
+                          <a:latin typeface="Meiryo UI"/>
                         </a:defRPr>
                       </a:pPr>
                       <a:r>
@@ -15341,7 +15341,7 @@
                 <a:solidFill>
                   <a:srgbClr val="1A1A1A"/>
                 </a:solidFill>
-                <a:latin typeface="Yu Gothic"/>
+                <a:latin typeface="Meiryo UI"/>
               </a:defRPr>
             </a:pPr>
             <a:r>
@@ -15370,7 +15370,7 @@
                 <a:solidFill>
                   <a:srgbClr val="333333"/>
                 </a:solidFill>
-                <a:latin typeface="Yu Gothic"/>
+                <a:latin typeface="Meiryo UI"/>
               </a:defRPr>
             </a:pPr>
             <a:r>
@@ -15409,7 +15409,7 @@
                 <a:solidFill>
                   <a:srgbClr val="333333"/>
                 </a:solidFill>
-                <a:latin typeface="Yu Gothic"/>
+                <a:latin typeface="Meiryo UI"/>
               </a:defRPr>
             </a:pPr>
             <a:r>
@@ -15448,7 +15448,7 @@
                 <a:solidFill>
                   <a:srgbClr val="333333"/>
                 </a:solidFill>
-                <a:latin typeface="Yu Gothic"/>
+                <a:latin typeface="Meiryo UI"/>
               </a:defRPr>
             </a:pPr>
             <a:r>
@@ -15495,7 +15495,7 @@
                 <a:solidFill>
                   <a:srgbClr val="333333"/>
                 </a:solidFill>
-                <a:latin typeface="Yu Gothic"/>
+                <a:latin typeface="Meiryo UI"/>
               </a:defRPr>
             </a:pPr>
             <a:r>
@@ -15524,7 +15524,7 @@
                 <a:solidFill>
                   <a:srgbClr val="1A1A1A"/>
                 </a:solidFill>
-                <a:latin typeface="Yu Gothic"/>
+                <a:latin typeface="Meiryo UI"/>
               </a:defRPr>
             </a:pPr>
             <a:r>
@@ -15563,7 +15563,7 @@
                 <a:solidFill>
                   <a:srgbClr val="333333"/>
                 </a:solidFill>
-                <a:latin typeface="Yu Gothic"/>
+                <a:latin typeface="Meiryo UI"/>
               </a:defRPr>
             </a:pPr>
             <a:r>
@@ -15602,7 +15602,7 @@
                 <a:solidFill>
                   <a:srgbClr val="333333"/>
                 </a:solidFill>
-                <a:latin typeface="Yu Gothic"/>
+                <a:latin typeface="Meiryo UI"/>
               </a:defRPr>
             </a:pPr>
             <a:r>
@@ -15649,7 +15649,7 @@
                 <a:solidFill>
                   <a:srgbClr val="333333"/>
                 </a:solidFill>
-                <a:latin typeface="Yu Gothic"/>
+                <a:latin typeface="Meiryo UI"/>
               </a:defRPr>
             </a:pPr>
             <a:r>
@@ -15678,7 +15678,7 @@
                 <a:solidFill>
                   <a:srgbClr val="1A1A1A"/>
                 </a:solidFill>
-                <a:latin typeface="Yu Gothic"/>
+                <a:latin typeface="Meiryo UI"/>
               </a:defRPr>
             </a:pPr>
             <a:r>
@@ -15717,7 +15717,7 @@
                 <a:solidFill>
                   <a:srgbClr val="333333"/>
                 </a:solidFill>
-                <a:latin typeface="Yu Gothic"/>
+                <a:latin typeface="Meiryo UI"/>
               </a:defRPr>
             </a:pPr>
             <a:r>
@@ -15756,7 +15756,7 @@
                 <a:solidFill>
                   <a:srgbClr val="333333"/>
                 </a:solidFill>
-                <a:latin typeface="Yu Gothic"/>
+                <a:latin typeface="Meiryo UI"/>
               </a:defRPr>
             </a:pPr>
             <a:r>
@@ -15803,7 +15803,7 @@
                 <a:solidFill>
                   <a:srgbClr val="333333"/>
                 </a:solidFill>
-                <a:latin typeface="Yu Gothic"/>
+                <a:latin typeface="Meiryo UI"/>
               </a:defRPr>
             </a:pPr>
             <a:r>
@@ -15832,7 +15832,7 @@
                 <a:solidFill>
                   <a:srgbClr val="1A1A1A"/>
                 </a:solidFill>
-                <a:latin typeface="Yu Gothic"/>
+                <a:latin typeface="Meiryo UI"/>
               </a:defRPr>
             </a:pPr>
             <a:r>
@@ -15871,7 +15871,7 @@
                 <a:solidFill>
                   <a:srgbClr val="333333"/>
                 </a:solidFill>
-                <a:latin typeface="Yu Gothic"/>
+                <a:latin typeface="Meiryo UI"/>
               </a:defRPr>
             </a:pPr>
             <a:r>
@@ -15910,7 +15910,7 @@
                 <a:solidFill>
                   <a:srgbClr val="333333"/>
                 </a:solidFill>
-                <a:latin typeface="Yu Gothic"/>
+                <a:latin typeface="Meiryo UI"/>
               </a:defRPr>
             </a:pPr>
             <a:r>
@@ -15949,7 +15949,7 @@
                 <a:solidFill>
                   <a:srgbClr val="333333"/>
                 </a:solidFill>
-                <a:latin typeface="Yu Gothic"/>
+                <a:latin typeface="Meiryo UI"/>
               </a:defRPr>
             </a:pPr>
             <a:r>
@@ -15996,7 +15996,7 @@
                 <a:solidFill>
                   <a:srgbClr val="333333"/>
                 </a:solidFill>
-                <a:latin typeface="Yu Gothic"/>
+                <a:latin typeface="Meiryo UI"/>
               </a:defRPr>
             </a:pPr>
             <a:r>
@@ -16025,7 +16025,7 @@
                 <a:solidFill>
                   <a:srgbClr val="1A1A1A"/>
                 </a:solidFill>
-                <a:latin typeface="Yu Gothic"/>
+                <a:latin typeface="Meiryo UI"/>
               </a:defRPr>
             </a:pPr>
             <a:r>
@@ -16064,7 +16064,7 @@
                 <a:solidFill>
                   <a:srgbClr val="333333"/>
                 </a:solidFill>
-                <a:latin typeface="Yu Gothic"/>
+                <a:latin typeface="Meiryo UI"/>
               </a:defRPr>
             </a:pPr>
             <a:r>
@@ -16103,7 +16103,7 @@
                 <a:solidFill>
                   <a:srgbClr val="333333"/>
                 </a:solidFill>
-                <a:latin typeface="Yu Gothic"/>
+                <a:latin typeface="Meiryo UI"/>
               </a:defRPr>
             </a:pPr>
             <a:r>
@@ -16142,7 +16142,7 @@
                 <a:solidFill>
                   <a:srgbClr val="333333"/>
                 </a:solidFill>
-                <a:latin typeface="Yu Gothic"/>
+                <a:latin typeface="Meiryo UI"/>
               </a:defRPr>
             </a:pPr>
             <a:r>
@@ -16189,7 +16189,7 @@
                 <a:solidFill>
                   <a:srgbClr val="333333"/>
                 </a:solidFill>
-                <a:latin typeface="Yu Gothic"/>
+                <a:latin typeface="Meiryo UI"/>
               </a:defRPr>
             </a:pPr>
             <a:r>
@@ -16218,7 +16218,7 @@
                 <a:solidFill>
                   <a:srgbClr val="1A1A1A"/>
                 </a:solidFill>
-                <a:latin typeface="Yu Gothic"/>
+                <a:latin typeface="Meiryo UI"/>
               </a:defRPr>
             </a:pPr>
             <a:r>
@@ -16257,7 +16257,7 @@
                 <a:solidFill>
                   <a:srgbClr val="333333"/>
                 </a:solidFill>
-                <a:latin typeface="Yu Gothic"/>
+                <a:latin typeface="Meiryo UI"/>
               </a:defRPr>
             </a:pPr>
             <a:r>
@@ -16296,7 +16296,7 @@
                 <a:solidFill>
                   <a:srgbClr val="333333"/>
                 </a:solidFill>
-                <a:latin typeface="Yu Gothic"/>
+                <a:latin typeface="Meiryo UI"/>
               </a:defRPr>
             </a:pPr>
             <a:r>
@@ -16335,7 +16335,7 @@
                 <a:solidFill>
                   <a:srgbClr val="333333"/>
                 </a:solidFill>
-                <a:latin typeface="Yu Gothic"/>
+                <a:latin typeface="Meiryo UI"/>
               </a:defRPr>
             </a:pPr>
             <a:r>
@@ -16382,7 +16382,7 @@
                 <a:solidFill>
                   <a:srgbClr val="333333"/>
                 </a:solidFill>
-                <a:latin typeface="Yu Gothic"/>
+                <a:latin typeface="Meiryo UI"/>
               </a:defRPr>
             </a:pPr>
             <a:r>
@@ -16411,7 +16411,7 @@
                 <a:solidFill>
                   <a:srgbClr val="1A1A1A"/>
                 </a:solidFill>
-                <a:latin typeface="Yu Gothic"/>
+                <a:latin typeface="Meiryo UI"/>
               </a:defRPr>
             </a:pPr>
             <a:r>
@@ -16450,7 +16450,7 @@
                 <a:solidFill>
                   <a:srgbClr val="333333"/>
                 </a:solidFill>
-                <a:latin typeface="Yu Gothic"/>
+                <a:latin typeface="Meiryo UI"/>
               </a:defRPr>
             </a:pPr>
             <a:r>
@@ -16489,7 +16489,7 @@
                 <a:solidFill>
                   <a:srgbClr val="333333"/>
                 </a:solidFill>
-                <a:latin typeface="Yu Gothic"/>
+                <a:latin typeface="Meiryo UI"/>
               </a:defRPr>
             </a:pPr>
             <a:r>
@@ -16528,7 +16528,7 @@
                 <a:solidFill>
                   <a:srgbClr val="333333"/>
                 </a:solidFill>
-                <a:latin typeface="Yu Gothic"/>
+                <a:latin typeface="Meiryo UI"/>
               </a:defRPr>
             </a:pPr>
             <a:r>
@@ -16575,7 +16575,7 @@
                 <a:solidFill>
                   <a:srgbClr val="1A1A1A"/>
                 </a:solidFill>
-                <a:latin typeface="Yu Gothic"/>
+                <a:latin typeface="Meiryo UI"/>
               </a:defRPr>
             </a:pPr>
             <a:r>
@@ -16604,7 +16604,7 @@
                 <a:solidFill>
                   <a:srgbClr val="333333"/>
                 </a:solidFill>
-                <a:latin typeface="Yu Gothic"/>
+                <a:latin typeface="Meiryo UI"/>
               </a:defRPr>
             </a:pPr>
             <a:r>
@@ -16643,7 +16643,7 @@
                 <a:solidFill>
                   <a:srgbClr val="333333"/>
                 </a:solidFill>
-                <a:latin typeface="Yu Gothic"/>
+                <a:latin typeface="Meiryo UI"/>
               </a:defRPr>
             </a:pPr>
             <a:r>
@@ -16682,7 +16682,7 @@
                 <a:solidFill>
                   <a:srgbClr val="333333"/>
                 </a:solidFill>
-                <a:latin typeface="Yu Gothic"/>
+                <a:latin typeface="Meiryo UI"/>
               </a:defRPr>
             </a:pPr>
             <a:r>
@@ -16721,7 +16721,7 @@
                 <a:solidFill>
                   <a:srgbClr val="333333"/>
                 </a:solidFill>
-                <a:latin typeface="Yu Gothic"/>
+                <a:latin typeface="Meiryo UI"/>
               </a:defRPr>
             </a:pPr>
             <a:r>
@@ -16768,7 +16768,7 @@
                 <a:solidFill>
                   <a:srgbClr val="1A1A1A"/>
                 </a:solidFill>
-                <a:latin typeface="Yu Gothic"/>
+                <a:latin typeface="Meiryo UI"/>
               </a:defRPr>
             </a:pPr>
             <a:r>
@@ -16797,7 +16797,7 @@
                 <a:solidFill>
                   <a:srgbClr val="333333"/>
                 </a:solidFill>
-                <a:latin typeface="Yu Gothic"/>
+                <a:latin typeface="Meiryo UI"/>
               </a:defRPr>
             </a:pPr>
             <a:r>
@@ -16836,7 +16836,7 @@
                 <a:solidFill>
                   <a:srgbClr val="333333"/>
                 </a:solidFill>
-                <a:latin typeface="Yu Gothic"/>
+                <a:latin typeface="Meiryo UI"/>
               </a:defRPr>
             </a:pPr>
             <a:r>
@@ -16852,7 +16852,7 @@
                 <a:solidFill>
                   <a:srgbClr val="333333"/>
                 </a:solidFill>
-                <a:latin typeface="Yu Gothic"/>
+                <a:latin typeface="Meiryo UI"/>
               </a:defRPr>
             </a:pPr>
             <a:r>
@@ -16868,7 +16868,7 @@
                 <a:solidFill>
                   <a:srgbClr val="333333"/>
                 </a:solidFill>
-                <a:latin typeface="Yu Gothic"/>
+                <a:latin typeface="Meiryo UI"/>
               </a:defRPr>
             </a:pPr>
             <a:r>
@@ -16939,7 +16939,7 @@
                 <a:solidFill>
                   <a:srgbClr val="1A1A1A"/>
                 </a:solidFill>
-                <a:latin typeface="Yu Gothic"/>
+                <a:latin typeface="Meiryo UI"/>
               </a:defRPr>
             </a:pPr>
             <a:r>
@@ -16968,7 +16968,7 @@
                 <a:solidFill>
                   <a:srgbClr val="333333"/>
                 </a:solidFill>
-                <a:latin typeface="Yu Gothic"/>
+                <a:latin typeface="Meiryo UI"/>
               </a:defRPr>
             </a:pPr>
             <a:r>
@@ -17007,7 +17007,7 @@
                 <a:solidFill>
                   <a:srgbClr val="333333"/>
                 </a:solidFill>
-                <a:latin typeface="Yu Gothic"/>
+                <a:latin typeface="Meiryo UI"/>
               </a:defRPr>
             </a:pPr>
             <a:r>
@@ -17046,7 +17046,7 @@
                 <a:solidFill>
                   <a:srgbClr val="333333"/>
                 </a:solidFill>
-                <a:latin typeface="Yu Gothic"/>
+                <a:latin typeface="Meiryo UI"/>
               </a:defRPr>
             </a:pPr>
             <a:r>
@@ -17085,7 +17085,7 @@
                 <a:solidFill>
                   <a:srgbClr val="333333"/>
                 </a:solidFill>
-                <a:latin typeface="Yu Gothic"/>
+                <a:latin typeface="Meiryo UI"/>
               </a:defRPr>
             </a:pPr>
             <a:r>
@@ -17132,7 +17132,7 @@
                 <a:solidFill>
                   <a:srgbClr val="1A1A1A"/>
                 </a:solidFill>
-                <a:latin typeface="Yu Gothic"/>
+                <a:latin typeface="Meiryo UI"/>
               </a:defRPr>
             </a:pPr>
             <a:r>
@@ -17161,7 +17161,7 @@
                 <a:solidFill>
                   <a:srgbClr val="333333"/>
                 </a:solidFill>
-                <a:latin typeface="Yu Gothic"/>
+                <a:latin typeface="Meiryo UI"/>
               </a:defRPr>
             </a:pPr>
             <a:r>
@@ -17200,7 +17200,7 @@
                 <a:solidFill>
                   <a:srgbClr val="333333"/>
                 </a:solidFill>
-                <a:latin typeface="Yu Gothic"/>
+                <a:latin typeface="Meiryo UI"/>
               </a:defRPr>
             </a:pPr>
             <a:r>
@@ -17239,7 +17239,7 @@
                 <a:solidFill>
                   <a:srgbClr val="333333"/>
                 </a:solidFill>
-                <a:latin typeface="Yu Gothic"/>
+                <a:latin typeface="Meiryo UI"/>
               </a:defRPr>
             </a:pPr>
             <a:r>
@@ -17278,7 +17278,7 @@
                 <a:solidFill>
                   <a:srgbClr val="333333"/>
                 </a:solidFill>
-                <a:latin typeface="Yu Gothic"/>
+                <a:latin typeface="Meiryo UI"/>
               </a:defRPr>
             </a:pPr>
             <a:r>
@@ -17317,7 +17317,7 @@
                 <a:solidFill>
                   <a:srgbClr val="333333"/>
                 </a:solidFill>
-                <a:latin typeface="Yu Gothic"/>
+                <a:latin typeface="Meiryo UI"/>
               </a:defRPr>
             </a:pPr>
             <a:r>
@@ -17364,7 +17364,7 @@
                 <a:solidFill>
                   <a:srgbClr val="1A1A1A"/>
                 </a:solidFill>
-                <a:latin typeface="Yu Gothic"/>
+                <a:latin typeface="Meiryo UI"/>
               </a:defRPr>
             </a:pPr>
             <a:r>
@@ -17393,7 +17393,7 @@
                 <a:solidFill>
                   <a:srgbClr val="333333"/>
                 </a:solidFill>
-                <a:latin typeface="Yu Gothic"/>
+                <a:latin typeface="Meiryo UI"/>
               </a:defRPr>
             </a:pPr>
             <a:r>
@@ -17432,7 +17432,7 @@
                 <a:solidFill>
                   <a:srgbClr val="333333"/>
                 </a:solidFill>
-                <a:latin typeface="Yu Gothic"/>
+                <a:latin typeface="Meiryo UI"/>
               </a:defRPr>
             </a:pPr>
             <a:r>
@@ -17471,7 +17471,7 @@
                 <a:solidFill>
                   <a:srgbClr val="333333"/>
                 </a:solidFill>
-                <a:latin typeface="Yu Gothic"/>
+                <a:latin typeface="Meiryo UI"/>
               </a:defRPr>
             </a:pPr>
             <a:r>
@@ -17510,7 +17510,7 @@
                 <a:solidFill>
                   <a:srgbClr val="333333"/>
                 </a:solidFill>
-                <a:latin typeface="Yu Gothic"/>
+                <a:latin typeface="Meiryo UI"/>
               </a:defRPr>
             </a:pPr>
             <a:r>
@@ -17549,7 +17549,7 @@
                 <a:solidFill>
                   <a:srgbClr val="333333"/>
                 </a:solidFill>
-                <a:latin typeface="Yu Gothic"/>
+                <a:latin typeface="Meiryo UI"/>
               </a:defRPr>
             </a:pPr>
             <a:r>
@@ -17596,7 +17596,7 @@
                 <a:solidFill>
                   <a:srgbClr val="1A1A1A"/>
                 </a:solidFill>
-                <a:latin typeface="Yu Gothic"/>
+                <a:latin typeface="Meiryo UI"/>
               </a:defRPr>
             </a:pPr>
             <a:r>
@@ -17635,7 +17635,7 @@
                 <a:solidFill>
                   <a:srgbClr val="333333"/>
                 </a:solidFill>
-                <a:latin typeface="Yu Gothic"/>
+                <a:latin typeface="Meiryo UI"/>
               </a:defRPr>
             </a:pPr>
             <a:r>
@@ -17674,7 +17674,7 @@
                 <a:solidFill>
                   <a:srgbClr val="333333"/>
                 </a:solidFill>
-                <a:latin typeface="Yu Gothic"/>
+                <a:latin typeface="Meiryo UI"/>
               </a:defRPr>
             </a:pPr>
             <a:r>
@@ -17713,7 +17713,7 @@
                 <a:solidFill>
                   <a:srgbClr val="333333"/>
                 </a:solidFill>
-                <a:latin typeface="Yu Gothic"/>
+                <a:latin typeface="Meiryo UI"/>
               </a:defRPr>
             </a:pPr>
             <a:r>
@@ -17760,7 +17760,7 @@
                 <a:solidFill>
                   <a:srgbClr val="1A1A1A"/>
                 </a:solidFill>
-                <a:latin typeface="Yu Gothic"/>
+                <a:latin typeface="Meiryo UI"/>
               </a:defRPr>
             </a:pPr>
             <a:r>
@@ -17799,7 +17799,7 @@
                 <a:solidFill>
                   <a:srgbClr val="333333"/>
                 </a:solidFill>
-                <a:latin typeface="Yu Gothic"/>
+                <a:latin typeface="Meiryo UI"/>
               </a:defRPr>
             </a:pPr>
             <a:r>
@@ -17838,7 +17838,7 @@
                 <a:solidFill>
                   <a:srgbClr val="333333"/>
                 </a:solidFill>
-                <a:latin typeface="Yu Gothic"/>
+                <a:latin typeface="Meiryo UI"/>
               </a:defRPr>
             </a:pPr>
             <a:r>
@@ -17877,7 +17877,7 @@
                 <a:solidFill>
                   <a:srgbClr val="333333"/>
                 </a:solidFill>
-                <a:latin typeface="Yu Gothic"/>
+                <a:latin typeface="Meiryo UI"/>
               </a:defRPr>
             </a:pPr>
             <a:r>
@@ -17924,7 +17924,7 @@
                 <a:solidFill>
                   <a:srgbClr val="333333"/>
                 </a:solidFill>
-                <a:latin typeface="Yu Gothic"/>
+                <a:latin typeface="Meiryo UI"/>
               </a:defRPr>
             </a:pPr>
             <a:r>
@@ -17953,7 +17953,7 @@
                 <a:solidFill>
                   <a:srgbClr val="1A1A1A"/>
                 </a:solidFill>
-                <a:latin typeface="Yu Gothic"/>
+                <a:latin typeface="Meiryo UI"/>
               </a:defRPr>
             </a:pPr>
             <a:r>
@@ -17992,7 +17992,7 @@
                 <a:solidFill>
                   <a:srgbClr val="333333"/>
                 </a:solidFill>
-                <a:latin typeface="Yu Gothic"/>
+                <a:latin typeface="Meiryo UI"/>
               </a:defRPr>
             </a:pPr>
             <a:r>
@@ -18008,7 +18008,7 @@
                 <a:solidFill>
                   <a:srgbClr val="333333"/>
                 </a:solidFill>
-                <a:latin typeface="Yu Gothic"/>
+                <a:latin typeface="Meiryo UI"/>
               </a:defRPr>
             </a:pPr>
             <a:r>
@@ -18024,7 +18024,7 @@
                 <a:solidFill>
                   <a:srgbClr val="333333"/>
                 </a:solidFill>
-                <a:latin typeface="Yu Gothic"/>
+                <a:latin typeface="Meiryo UI"/>
               </a:defRPr>
             </a:pPr>
             <a:r>
@@ -18063,7 +18063,7 @@
                 <a:solidFill>
                   <a:srgbClr val="333333"/>
                 </a:solidFill>
-                <a:latin typeface="Yu Gothic"/>
+                <a:latin typeface="Meiryo UI"/>
               </a:defRPr>
             </a:pPr>
             <a:r>
@@ -18079,7 +18079,7 @@
                 <a:solidFill>
                   <a:srgbClr val="333333"/>
                 </a:solidFill>
-                <a:latin typeface="Yu Gothic"/>
+                <a:latin typeface="Meiryo UI"/>
               </a:defRPr>
             </a:pPr>
             <a:r>
@@ -18095,7 +18095,7 @@
                 <a:solidFill>
                   <a:srgbClr val="333333"/>
                 </a:solidFill>
-                <a:latin typeface="Yu Gothic"/>
+                <a:latin typeface="Meiryo UI"/>
               </a:defRPr>
             </a:pPr>
             <a:r>
@@ -18160,7 +18160,7 @@
                 <a:solidFill>
                   <a:srgbClr val="333333"/>
                 </a:solidFill>
-                <a:latin typeface="Yu Gothic"/>
+                <a:latin typeface="Meiryo UI"/>
               </a:defRPr>
             </a:pPr>
             <a:r>
@@ -18189,7 +18189,7 @@
                 <a:solidFill>
                   <a:srgbClr val="1A1A1A"/>
                 </a:solidFill>
-                <a:latin typeface="Yu Gothic"/>
+                <a:latin typeface="Meiryo UI"/>
               </a:defRPr>
             </a:pPr>
             <a:r>
@@ -18228,7 +18228,7 @@
                 <a:solidFill>
                   <a:srgbClr val="333333"/>
                 </a:solidFill>
-                <a:latin typeface="Yu Gothic"/>
+                <a:latin typeface="Meiryo UI"/>
               </a:defRPr>
             </a:pPr>
             <a:r>
@@ -18267,7 +18267,7 @@
                 <a:solidFill>
                   <a:srgbClr val="333333"/>
                 </a:solidFill>
-                <a:latin typeface="Yu Gothic"/>
+                <a:latin typeface="Meiryo UI"/>
               </a:defRPr>
             </a:pPr>
             <a:r>
@@ -18306,7 +18306,7 @@
                 <a:solidFill>
                   <a:srgbClr val="333333"/>
                 </a:solidFill>
-                <a:latin typeface="Yu Gothic"/>
+                <a:latin typeface="Meiryo UI"/>
               </a:defRPr>
             </a:pPr>
             <a:r>
@@ -18353,7 +18353,7 @@
                 <a:solidFill>
                   <a:srgbClr val="333333"/>
                 </a:solidFill>
-                <a:latin typeface="Yu Gothic"/>
+                <a:latin typeface="Meiryo UI"/>
               </a:defRPr>
             </a:pPr>
             <a:r>
@@ -18382,7 +18382,7 @@
                 <a:solidFill>
                   <a:srgbClr val="1A1A1A"/>
                 </a:solidFill>
-                <a:latin typeface="Yu Gothic"/>
+                <a:latin typeface="Meiryo UI"/>
               </a:defRPr>
             </a:pPr>
             <a:r>
@@ -18421,7 +18421,7 @@
                 <a:solidFill>
                   <a:srgbClr val="333333"/>
                 </a:solidFill>
-                <a:latin typeface="Yu Gothic"/>
+                <a:latin typeface="Meiryo UI"/>
               </a:defRPr>
             </a:pPr>
             <a:r>
@@ -18460,7 +18460,7 @@
                 <a:solidFill>
                   <a:srgbClr val="333333"/>
                 </a:solidFill>
-                <a:latin typeface="Yu Gothic"/>
+                <a:latin typeface="Meiryo UI"/>
               </a:defRPr>
             </a:pPr>
             <a:r>
@@ -18499,7 +18499,7 @@
                 <a:solidFill>
                   <a:srgbClr val="333333"/>
                 </a:solidFill>
-                <a:latin typeface="Yu Gothic"/>
+                <a:latin typeface="Meiryo UI"/>
               </a:defRPr>
             </a:pPr>
             <a:r>
@@ -18538,7 +18538,7 @@
                 <a:solidFill>
                   <a:srgbClr val="333333"/>
                 </a:solidFill>
-                <a:latin typeface="Yu Gothic"/>
+                <a:latin typeface="Meiryo UI"/>
               </a:defRPr>
             </a:pPr>
             <a:r>
@@ -18585,7 +18585,7 @@
                 <a:solidFill>
                   <a:srgbClr val="333333"/>
                 </a:solidFill>
-                <a:latin typeface="Yu Gothic"/>
+                <a:latin typeface="Meiryo UI"/>
               </a:defRPr>
             </a:pPr>
             <a:r>
@@ -18614,7 +18614,7 @@
                 <a:solidFill>
                   <a:srgbClr val="1A1A1A"/>
                 </a:solidFill>
-                <a:latin typeface="Yu Gothic"/>
+                <a:latin typeface="Meiryo UI"/>
               </a:defRPr>
             </a:pPr>
             <a:r>
@@ -18653,7 +18653,7 @@
                 <a:solidFill>
                   <a:srgbClr val="333333"/>
                 </a:solidFill>
-                <a:latin typeface="Yu Gothic"/>
+                <a:latin typeface="Meiryo UI"/>
               </a:defRPr>
             </a:pPr>
             <a:r>
@@ -18692,7 +18692,7 @@
                 <a:solidFill>
                   <a:srgbClr val="333333"/>
                 </a:solidFill>
-                <a:latin typeface="Yu Gothic"/>
+                <a:latin typeface="Meiryo UI"/>
               </a:defRPr>
             </a:pPr>
             <a:r>
@@ -18731,7 +18731,7 @@
                 <a:solidFill>
                   <a:srgbClr val="333333"/>
                 </a:solidFill>
-                <a:latin typeface="Yu Gothic"/>
+                <a:latin typeface="Meiryo UI"/>
               </a:defRPr>
             </a:pPr>
             <a:r>
@@ -18770,7 +18770,7 @@
                 <a:solidFill>
                   <a:srgbClr val="333333"/>
                 </a:solidFill>
-                <a:latin typeface="Yu Gothic"/>
+                <a:latin typeface="Meiryo UI"/>
               </a:defRPr>
             </a:pPr>
             <a:r>
@@ -18817,7 +18817,7 @@
                 <a:solidFill>
                   <a:srgbClr val="333333"/>
                 </a:solidFill>
-                <a:latin typeface="Yu Gothic"/>
+                <a:latin typeface="Meiryo UI"/>
               </a:defRPr>
             </a:pPr>
             <a:r>
@@ -18846,7 +18846,7 @@
                 <a:solidFill>
                   <a:srgbClr val="1A1A1A"/>
                 </a:solidFill>
-                <a:latin typeface="Yu Gothic"/>
+                <a:latin typeface="Meiryo UI"/>
               </a:defRPr>
             </a:pPr>
             <a:r>
@@ -18885,7 +18885,7 @@
                 <a:solidFill>
                   <a:srgbClr val="333333"/>
                 </a:solidFill>
-                <a:latin typeface="Yu Gothic"/>
+                <a:latin typeface="Meiryo UI"/>
               </a:defRPr>
             </a:pPr>
             <a:r>
@@ -18924,7 +18924,7 @@
                 <a:solidFill>
                   <a:srgbClr val="333333"/>
                 </a:solidFill>
-                <a:latin typeface="Yu Gothic"/>
+                <a:latin typeface="Meiryo UI"/>
               </a:defRPr>
             </a:pPr>
             <a:r>
@@ -18963,7 +18963,7 @@
                 <a:solidFill>
                   <a:srgbClr val="333333"/>
                 </a:solidFill>
-                <a:latin typeface="Yu Gothic"/>
+                <a:latin typeface="Meiryo UI"/>
               </a:defRPr>
             </a:pPr>
             <a:r>
@@ -19002,7 +19002,7 @@
                 <a:solidFill>
                   <a:srgbClr val="333333"/>
                 </a:solidFill>
-                <a:latin typeface="Yu Gothic"/>
+                <a:latin typeface="Meiryo UI"/>
               </a:defRPr>
             </a:pPr>
             <a:r>
@@ -19041,7 +19041,7 @@
                 <a:solidFill>
                   <a:srgbClr val="333333"/>
                 </a:solidFill>
-                <a:latin typeface="Yu Gothic"/>
+                <a:latin typeface="Meiryo UI"/>
               </a:defRPr>
             </a:pPr>
             <a:r>
@@ -19080,7 +19080,7 @@
                 <a:solidFill>
                   <a:srgbClr val="333333"/>
                 </a:solidFill>
-                <a:latin typeface="Yu Gothic"/>
+                <a:latin typeface="Meiryo UI"/>
               </a:defRPr>
             </a:pPr>
             <a:r>
@@ -19127,7 +19127,7 @@
                 <a:solidFill>
                   <a:srgbClr val="1A1A1A"/>
                 </a:solidFill>
-                <a:latin typeface="Yu Gothic"/>
+                <a:latin typeface="Meiryo UI"/>
               </a:defRPr>
             </a:pPr>
             <a:r>
@@ -19156,7 +19156,7 @@
                 <a:solidFill>
                   <a:srgbClr val="333333"/>
                 </a:solidFill>
-                <a:latin typeface="Yu Gothic"/>
+                <a:latin typeface="Meiryo UI"/>
               </a:defRPr>
             </a:pPr>
             <a:r>
@@ -19227,7 +19227,7 @@
                 <a:solidFill>
                   <a:srgbClr val="333333"/>
                 </a:solidFill>
-                <a:latin typeface="Yu Gothic"/>
+                <a:latin typeface="Meiryo UI"/>
               </a:defRPr>
             </a:pPr>
             <a:r>
@@ -19256,7 +19256,7 @@
                 <a:solidFill>
                   <a:srgbClr val="1A1A1A"/>
                 </a:solidFill>
-                <a:latin typeface="Yu Gothic"/>
+                <a:latin typeface="Meiryo UI"/>
               </a:defRPr>
             </a:pPr>
             <a:r>
@@ -19295,7 +19295,7 @@
                 <a:solidFill>
                   <a:srgbClr val="333333"/>
                 </a:solidFill>
-                <a:latin typeface="Yu Gothic"/>
+                <a:latin typeface="Meiryo UI"/>
               </a:defRPr>
             </a:pPr>
             <a:r>
@@ -19334,7 +19334,7 @@
                 <a:solidFill>
                   <a:srgbClr val="333333"/>
                 </a:solidFill>
-                <a:latin typeface="Yu Gothic"/>
+                <a:latin typeface="Meiryo UI"/>
               </a:defRPr>
             </a:pPr>
             <a:r>
@@ -19373,7 +19373,7 @@
                 <a:solidFill>
                   <a:srgbClr val="333333"/>
                 </a:solidFill>
-                <a:latin typeface="Yu Gothic"/>
+                <a:latin typeface="Meiryo UI"/>
               </a:defRPr>
             </a:pPr>
             <a:r>
@@ -19412,7 +19412,7 @@
                 <a:solidFill>
                   <a:srgbClr val="333333"/>
                 </a:solidFill>
-                <a:latin typeface="Yu Gothic"/>
+                <a:latin typeface="Meiryo UI"/>
               </a:defRPr>
             </a:pPr>
             <a:r>
@@ -19451,7 +19451,7 @@
                 <a:solidFill>
                   <a:srgbClr val="333333"/>
                 </a:solidFill>
-                <a:latin typeface="Yu Gothic"/>
+                <a:latin typeface="Meiryo UI"/>
               </a:defRPr>
             </a:pPr>
             <a:r>
@@ -19490,7 +19490,7 @@
                 <a:solidFill>
                   <a:srgbClr val="333333"/>
                 </a:solidFill>
-                <a:latin typeface="Yu Gothic"/>
+                <a:latin typeface="Meiryo UI"/>
               </a:defRPr>
             </a:pPr>
             <a:r>
@@ -19537,7 +19537,7 @@
                 <a:solidFill>
                   <a:srgbClr val="333333"/>
                 </a:solidFill>
-                <a:latin typeface="Yu Gothic"/>
+                <a:latin typeface="Meiryo UI"/>
               </a:defRPr>
             </a:pPr>
             <a:r>
@@ -19566,7 +19566,7 @@
                 <a:solidFill>
                   <a:srgbClr val="1A1A1A"/>
                 </a:solidFill>
-                <a:latin typeface="Yu Gothic"/>
+                <a:latin typeface="Meiryo UI"/>
               </a:defRPr>
             </a:pPr>
             <a:r>
@@ -19605,7 +19605,7 @@
                 <a:solidFill>
                   <a:srgbClr val="333333"/>
                 </a:solidFill>
-                <a:latin typeface="Yu Gothic"/>
+                <a:latin typeface="Meiryo UI"/>
               </a:defRPr>
             </a:pPr>
             <a:r>
@@ -19644,7 +19644,7 @@
                 <a:solidFill>
                   <a:srgbClr val="333333"/>
                 </a:solidFill>
-                <a:latin typeface="Yu Gothic"/>
+                <a:latin typeface="Meiryo UI"/>
               </a:defRPr>
             </a:pPr>
             <a:r>
@@ -19683,7 +19683,7 @@
                 <a:solidFill>
                   <a:srgbClr val="333333"/>
                 </a:solidFill>
-                <a:latin typeface="Yu Gothic"/>
+                <a:latin typeface="Meiryo UI"/>
               </a:defRPr>
             </a:pPr>
             <a:r>
@@ -19722,7 +19722,7 @@
                 <a:solidFill>
                   <a:srgbClr val="333333"/>
                 </a:solidFill>
-                <a:latin typeface="Yu Gothic"/>
+                <a:latin typeface="Meiryo UI"/>
               </a:defRPr>
             </a:pPr>
             <a:r>
@@ -19761,7 +19761,7 @@
                 <a:solidFill>
                   <a:srgbClr val="333333"/>
                 </a:solidFill>
-                <a:latin typeface="Yu Gothic"/>
+                <a:latin typeface="Meiryo UI"/>
               </a:defRPr>
             </a:pPr>
             <a:r>
@@ -19800,7 +19800,7 @@
                 <a:solidFill>
                   <a:srgbClr val="333333"/>
                 </a:solidFill>
-                <a:latin typeface="Yu Gothic"/>
+                <a:latin typeface="Meiryo UI"/>
               </a:defRPr>
             </a:pPr>
             <a:r>
@@ -19839,7 +19839,7 @@
                 <a:solidFill>
                   <a:srgbClr val="333333"/>
                 </a:solidFill>
-                <a:latin typeface="Yu Gothic"/>
+                <a:latin typeface="Meiryo UI"/>
               </a:defRPr>
             </a:pPr>
             <a:r>
@@ -19878,7 +19878,7 @@
                 <a:solidFill>
                   <a:srgbClr val="333333"/>
                 </a:solidFill>
-                <a:latin typeface="Yu Gothic"/>
+                <a:latin typeface="Meiryo UI"/>
               </a:defRPr>
             </a:pPr>
             <a:r>
@@ -19917,7 +19917,7 @@
                 <a:solidFill>
                   <a:srgbClr val="333333"/>
                 </a:solidFill>
-                <a:latin typeface="Yu Gothic"/>
+                <a:latin typeface="Meiryo UI"/>
               </a:defRPr>
             </a:pPr>
             <a:r>
@@ -19964,7 +19964,7 @@
                 <a:solidFill>
                   <a:srgbClr val="333333"/>
                 </a:solidFill>
-                <a:latin typeface="Yu Gothic"/>
+                <a:latin typeface="Meiryo UI"/>
               </a:defRPr>
             </a:pPr>
             <a:r>
@@ -19993,7 +19993,7 @@
                 <a:solidFill>
                   <a:srgbClr val="1A1A1A"/>
                 </a:solidFill>
-                <a:latin typeface="Yu Gothic"/>
+                <a:latin typeface="Meiryo UI"/>
               </a:defRPr>
             </a:pPr>
             <a:r>
@@ -20032,7 +20032,7 @@
                 <a:solidFill>
                   <a:srgbClr val="333333"/>
                 </a:solidFill>
-                <a:latin typeface="Yu Gothic"/>
+                <a:latin typeface="Meiryo UI"/>
               </a:defRPr>
             </a:pPr>
             <a:r>
@@ -20071,7 +20071,7 @@
                 <a:solidFill>
                   <a:srgbClr val="333333"/>
                 </a:solidFill>
-                <a:latin typeface="Yu Gothic"/>
+                <a:latin typeface="Meiryo UI"/>
               </a:defRPr>
             </a:pPr>
             <a:r>
@@ -20110,7 +20110,7 @@
                 <a:solidFill>
                   <a:srgbClr val="333333"/>
                 </a:solidFill>
-                <a:latin typeface="Yu Gothic"/>
+                <a:latin typeface="Meiryo UI"/>
               </a:defRPr>
             </a:pPr>
             <a:r>
@@ -20149,7 +20149,7 @@
                 <a:solidFill>
                   <a:srgbClr val="333333"/>
                 </a:solidFill>
-                <a:latin typeface="Yu Gothic"/>
+                <a:latin typeface="Meiryo UI"/>
               </a:defRPr>
             </a:pPr>
             <a:r>
@@ -20188,7 +20188,7 @@
                 <a:solidFill>
                   <a:srgbClr val="333333"/>
                 </a:solidFill>
-                <a:latin typeface="Yu Gothic"/>
+                <a:latin typeface="Meiryo UI"/>
               </a:defRPr>
             </a:pPr>
             <a:r>
@@ -20227,7 +20227,7 @@
                 <a:solidFill>
                   <a:srgbClr val="333333"/>
                 </a:solidFill>
-                <a:latin typeface="Yu Gothic"/>
+                <a:latin typeface="Meiryo UI"/>
               </a:defRPr>
             </a:pPr>
             <a:r>
@@ -20266,7 +20266,7 @@
                 <a:solidFill>
                   <a:srgbClr val="333333"/>
                 </a:solidFill>
-                <a:latin typeface="Yu Gothic"/>
+                <a:latin typeface="Meiryo UI"/>
               </a:defRPr>
             </a:pPr>
             <a:r>
@@ -20305,7 +20305,7 @@
                 <a:solidFill>
                   <a:srgbClr val="333333"/>
                 </a:solidFill>
-                <a:latin typeface="Yu Gothic"/>
+                <a:latin typeface="Meiryo UI"/>
               </a:defRPr>
             </a:pPr>
             <a:r>
@@ -20344,7 +20344,7 @@
                 <a:solidFill>
                   <a:srgbClr val="333333"/>
                 </a:solidFill>
-                <a:latin typeface="Yu Gothic"/>
+                <a:latin typeface="Meiryo UI"/>
               </a:defRPr>
             </a:pPr>
             <a:r>
@@ -20391,7 +20391,7 @@
                 <a:solidFill>
                   <a:srgbClr val="333333"/>
                 </a:solidFill>
-                <a:latin typeface="Yu Gothic"/>
+                <a:latin typeface="Meiryo UI"/>
               </a:defRPr>
             </a:pPr>
             <a:r>
@@ -20420,7 +20420,7 @@
                 <a:solidFill>
                   <a:srgbClr val="1A1A1A"/>
                 </a:solidFill>
-                <a:latin typeface="Yu Gothic"/>
+                <a:latin typeface="Meiryo UI"/>
               </a:defRPr>
             </a:pPr>
             <a:r>
@@ -20459,7 +20459,7 @@
                 <a:solidFill>
                   <a:srgbClr val="333333"/>
                 </a:solidFill>
-                <a:latin typeface="Yu Gothic"/>
+                <a:latin typeface="Meiryo UI"/>
               </a:defRPr>
             </a:pPr>
             <a:r>
@@ -20498,7 +20498,7 @@
                 <a:solidFill>
                   <a:srgbClr val="333333"/>
                 </a:solidFill>
-                <a:latin typeface="Yu Gothic"/>
+                <a:latin typeface="Meiryo UI"/>
               </a:defRPr>
             </a:pPr>
             <a:r>
@@ -20537,7 +20537,7 @@
                 <a:solidFill>
                   <a:srgbClr val="333333"/>
                 </a:solidFill>
-                <a:latin typeface="Yu Gothic"/>
+                <a:latin typeface="Meiryo UI"/>
               </a:defRPr>
             </a:pPr>
             <a:r>
@@ -20576,7 +20576,7 @@
                 <a:solidFill>
                   <a:srgbClr val="333333"/>
                 </a:solidFill>
-                <a:latin typeface="Yu Gothic"/>
+                <a:latin typeface="Meiryo UI"/>
               </a:defRPr>
             </a:pPr>
             <a:r>
@@ -20615,7 +20615,7 @@
                 <a:solidFill>
                   <a:srgbClr val="333333"/>
                 </a:solidFill>
-                <a:latin typeface="Yu Gothic"/>
+                <a:latin typeface="Meiryo UI"/>
               </a:defRPr>
             </a:pPr>
             <a:r>
@@ -20654,7 +20654,7 @@
                 <a:solidFill>
                   <a:srgbClr val="333333"/>
                 </a:solidFill>
-                <a:latin typeface="Yu Gothic"/>
+                <a:latin typeface="Meiryo UI"/>
               </a:defRPr>
             </a:pPr>
             <a:r>
@@ -20701,7 +20701,7 @@
                 <a:solidFill>
                   <a:srgbClr val="333333"/>
                 </a:solidFill>
-                <a:latin typeface="Yu Gothic"/>
+                <a:latin typeface="Meiryo UI"/>
               </a:defRPr>
             </a:pPr>
             <a:r>
@@ -20730,7 +20730,7 @@
                 <a:solidFill>
                   <a:srgbClr val="1A1A1A"/>
                 </a:solidFill>
-                <a:latin typeface="Yu Gothic"/>
+                <a:latin typeface="Meiryo UI"/>
               </a:defRPr>
             </a:pPr>
             <a:r>
@@ -20769,7 +20769,7 @@
                 <a:solidFill>
                   <a:srgbClr val="333333"/>
                 </a:solidFill>
-                <a:latin typeface="Yu Gothic"/>
+                <a:latin typeface="Meiryo UI"/>
               </a:defRPr>
             </a:pPr>
             <a:r>
@@ -20808,7 +20808,7 @@
                 <a:solidFill>
                   <a:srgbClr val="333333"/>
                 </a:solidFill>
-                <a:latin typeface="Yu Gothic"/>
+                <a:latin typeface="Meiryo UI"/>
               </a:defRPr>
             </a:pPr>
             <a:r>
@@ -20847,7 +20847,7 @@
                 <a:solidFill>
                   <a:srgbClr val="333333"/>
                 </a:solidFill>
-                <a:latin typeface="Yu Gothic"/>
+                <a:latin typeface="Meiryo UI"/>
               </a:defRPr>
             </a:pPr>
             <a:r>
@@ -20886,7 +20886,7 @@
                 <a:solidFill>
                   <a:srgbClr val="333333"/>
                 </a:solidFill>
-                <a:latin typeface="Yu Gothic"/>
+                <a:latin typeface="Meiryo UI"/>
               </a:defRPr>
             </a:pPr>
             <a:r>
@@ -20925,7 +20925,7 @@
                 <a:solidFill>
                   <a:srgbClr val="333333"/>
                 </a:solidFill>
-                <a:latin typeface="Yu Gothic"/>
+                <a:latin typeface="Meiryo UI"/>
               </a:defRPr>
             </a:pPr>
             <a:r>
@@ -20964,7 +20964,7 @@
                 <a:solidFill>
                   <a:srgbClr val="333333"/>
                 </a:solidFill>
-                <a:latin typeface="Yu Gothic"/>
+                <a:latin typeface="Meiryo UI"/>
               </a:defRPr>
             </a:pPr>
             <a:r>
@@ -21011,7 +21011,7 @@
                 <a:solidFill>
                   <a:srgbClr val="333333"/>
                 </a:solidFill>
-                <a:latin typeface="Yu Gothic"/>
+                <a:latin typeface="Meiryo UI"/>
               </a:defRPr>
             </a:pPr>
             <a:r>
@@ -21040,7 +21040,7 @@
                 <a:solidFill>
                   <a:srgbClr val="1A1A1A"/>
                 </a:solidFill>
-                <a:latin typeface="Yu Gothic"/>
+                <a:latin typeface="Meiryo UI"/>
               </a:defRPr>
             </a:pPr>
             <a:r>
@@ -21079,7 +21079,7 @@
                 <a:solidFill>
                   <a:srgbClr val="333333"/>
                 </a:solidFill>
-                <a:latin typeface="Yu Gothic"/>
+                <a:latin typeface="Meiryo UI"/>
               </a:defRPr>
             </a:pPr>
             <a:r>
@@ -21118,7 +21118,7 @@
                 <a:solidFill>
                   <a:srgbClr val="333333"/>
                 </a:solidFill>
-                <a:latin typeface="Yu Gothic"/>
+                <a:latin typeface="Meiryo UI"/>
               </a:defRPr>
             </a:pPr>
             <a:r>
@@ -21157,7 +21157,7 @@
                 <a:solidFill>
                   <a:srgbClr val="333333"/>
                 </a:solidFill>
-                <a:latin typeface="Yu Gothic"/>
+                <a:latin typeface="Meiryo UI"/>
               </a:defRPr>
             </a:pPr>
             <a:r>
@@ -21196,7 +21196,7 @@
                 <a:solidFill>
                   <a:srgbClr val="333333"/>
                 </a:solidFill>
-                <a:latin typeface="Yu Gothic"/>
+                <a:latin typeface="Meiryo UI"/>
               </a:defRPr>
             </a:pPr>
             <a:r>
@@ -21235,7 +21235,7 @@
                 <a:solidFill>
                   <a:srgbClr val="333333"/>
                 </a:solidFill>
-                <a:latin typeface="Yu Gothic"/>
+                <a:latin typeface="Meiryo UI"/>
               </a:defRPr>
             </a:pPr>
             <a:r>
@@ -21274,7 +21274,7 @@
                 <a:solidFill>
                   <a:srgbClr val="333333"/>
                 </a:solidFill>
-                <a:latin typeface="Yu Gothic"/>
+                <a:latin typeface="Meiryo UI"/>
               </a:defRPr>
             </a:pPr>
             <a:r>
@@ -21313,7 +21313,7 @@
                 <a:solidFill>
                   <a:srgbClr val="333333"/>
                 </a:solidFill>
-                <a:latin typeface="Yu Gothic"/>
+                <a:latin typeface="Meiryo UI"/>
               </a:defRPr>
             </a:pPr>
             <a:r>
@@ -21352,7 +21352,7 @@
                 <a:solidFill>
                   <a:srgbClr val="333333"/>
                 </a:solidFill>
-                <a:latin typeface="Yu Gothic"/>
+                <a:latin typeface="Meiryo UI"/>
               </a:defRPr>
             </a:pPr>
             <a:r>
@@ -21399,7 +21399,7 @@
                 <a:solidFill>
                   <a:srgbClr val="333333"/>
                 </a:solidFill>
-                <a:latin typeface="Yu Gothic"/>
+                <a:latin typeface="Meiryo UI"/>
               </a:defRPr>
             </a:pPr>
             <a:r>
@@ -21428,7 +21428,7 @@
                 <a:solidFill>
                   <a:srgbClr val="1A1A1A"/>
                 </a:solidFill>
-                <a:latin typeface="Yu Gothic"/>
+                <a:latin typeface="Meiryo UI"/>
               </a:defRPr>
             </a:pPr>
             <a:r>
@@ -21467,7 +21467,7 @@
                 <a:solidFill>
                   <a:srgbClr val="333333"/>
                 </a:solidFill>
-                <a:latin typeface="Yu Gothic"/>
+                <a:latin typeface="Meiryo UI"/>
               </a:defRPr>
             </a:pPr>
             <a:r>
@@ -21506,7 +21506,7 @@
                 <a:solidFill>
                   <a:srgbClr val="333333"/>
                 </a:solidFill>
-                <a:latin typeface="Yu Gothic"/>
+                <a:latin typeface="Meiryo UI"/>
               </a:defRPr>
             </a:pPr>
             <a:r>
@@ -21545,7 +21545,7 @@
                 <a:solidFill>
                   <a:srgbClr val="333333"/>
                 </a:solidFill>
-                <a:latin typeface="Yu Gothic"/>
+                <a:latin typeface="Meiryo UI"/>
               </a:defRPr>
             </a:pPr>
             <a:r>
@@ -21584,7 +21584,7 @@
                 <a:solidFill>
                   <a:srgbClr val="333333"/>
                 </a:solidFill>
-                <a:latin typeface="Yu Gothic"/>
+                <a:latin typeface="Meiryo UI"/>
               </a:defRPr>
             </a:pPr>
             <a:r>
@@ -21623,7 +21623,7 @@
                 <a:solidFill>
                   <a:srgbClr val="333333"/>
                 </a:solidFill>
-                <a:latin typeface="Yu Gothic"/>
+                <a:latin typeface="Meiryo UI"/>
               </a:defRPr>
             </a:pPr>
             <a:r>
@@ -21662,7 +21662,7 @@
                 <a:solidFill>
                   <a:srgbClr val="333333"/>
                 </a:solidFill>
-                <a:latin typeface="Yu Gothic"/>
+                <a:latin typeface="Meiryo UI"/>
               </a:defRPr>
             </a:pPr>
             <a:r>
@@ -21701,7 +21701,7 @@
                 <a:solidFill>
                   <a:srgbClr val="333333"/>
                 </a:solidFill>
-                <a:latin typeface="Yu Gothic"/>
+                <a:latin typeface="Meiryo UI"/>
               </a:defRPr>
             </a:pPr>
             <a:r>
@@ -21740,7 +21740,7 @@
                 <a:solidFill>
                   <a:srgbClr val="333333"/>
                 </a:solidFill>
-                <a:latin typeface="Yu Gothic"/>
+                <a:latin typeface="Meiryo UI"/>
               </a:defRPr>
             </a:pPr>
             <a:r>
@@ -21787,7 +21787,7 @@
                 <a:solidFill>
                   <a:srgbClr val="333333"/>
                 </a:solidFill>
-                <a:latin typeface="Yu Gothic"/>
+                <a:latin typeface="Meiryo UI"/>
               </a:defRPr>
             </a:pPr>
             <a:r>
@@ -21816,7 +21816,7 @@
                 <a:solidFill>
                   <a:srgbClr val="1A1A1A"/>
                 </a:solidFill>
-                <a:latin typeface="Yu Gothic"/>
+                <a:latin typeface="Meiryo UI"/>
               </a:defRPr>
             </a:pPr>
             <a:r>
@@ -21889,7 +21889,7 @@
                 <a:solidFill>
                   <a:srgbClr val="333333"/>
                 </a:solidFill>
-                <a:latin typeface="Yu Gothic"/>
+                <a:latin typeface="Meiryo UI"/>
               </a:defRPr>
             </a:pPr>
             <a:r>
@@ -21928,7 +21928,7 @@
                 <a:solidFill>
                   <a:srgbClr val="333333"/>
                 </a:solidFill>
-                <a:latin typeface="Yu Gothic"/>
+                <a:latin typeface="Meiryo UI"/>
               </a:defRPr>
             </a:pPr>
             <a:r>
@@ -21967,7 +21967,7 @@
                 <a:solidFill>
                   <a:srgbClr val="333333"/>
                 </a:solidFill>
-                <a:latin typeface="Yu Gothic"/>
+                <a:latin typeface="Meiryo UI"/>
               </a:defRPr>
             </a:pPr>
             <a:r>
@@ -22006,7 +22006,7 @@
                 <a:solidFill>
                   <a:srgbClr val="333333"/>
                 </a:solidFill>
-                <a:latin typeface="Yu Gothic"/>
+                <a:latin typeface="Meiryo UI"/>
               </a:defRPr>
             </a:pPr>
             <a:r>
@@ -22045,7 +22045,7 @@
                 <a:solidFill>
                   <a:srgbClr val="333333"/>
                 </a:solidFill>
-                <a:latin typeface="Yu Gothic"/>
+                <a:latin typeface="Meiryo UI"/>
               </a:defRPr>
             </a:pPr>
             <a:r>
@@ -22084,7 +22084,7 @@
                 <a:solidFill>
                   <a:srgbClr val="333333"/>
                 </a:solidFill>
-                <a:latin typeface="Yu Gothic"/>
+                <a:latin typeface="Meiryo UI"/>
               </a:defRPr>
             </a:pPr>
             <a:r>
@@ -22123,7 +22123,7 @@
                 <a:solidFill>
                   <a:srgbClr val="333333"/>
                 </a:solidFill>
-                <a:latin typeface="Yu Gothic"/>
+                <a:latin typeface="Meiryo UI"/>
               </a:defRPr>
             </a:pPr>
             <a:r>
@@ -22162,7 +22162,7 @@
                 <a:solidFill>
                   <a:srgbClr val="333333"/>
                 </a:solidFill>
-                <a:latin typeface="Yu Gothic"/>
+                <a:latin typeface="Meiryo UI"/>
               </a:defRPr>
             </a:pPr>
             <a:r>
@@ -22209,7 +22209,7 @@
                 <a:solidFill>
                   <a:srgbClr val="333333"/>
                 </a:solidFill>
-                <a:latin typeface="Yu Gothic"/>
+                <a:latin typeface="Meiryo UI"/>
               </a:defRPr>
             </a:pPr>
             <a:r>
@@ -22238,7 +22238,7 @@
                 <a:solidFill>
                   <a:srgbClr val="1A1A1A"/>
                 </a:solidFill>
-                <a:latin typeface="Yu Gothic"/>
+                <a:latin typeface="Meiryo UI"/>
               </a:defRPr>
             </a:pPr>
             <a:r>
@@ -22311,7 +22311,7 @@
                 <a:solidFill>
                   <a:srgbClr val="333333"/>
                 </a:solidFill>
-                <a:latin typeface="Yu Gothic"/>
+                <a:latin typeface="Meiryo UI"/>
               </a:defRPr>
             </a:pPr>
             <a:r>
@@ -22350,7 +22350,7 @@
                 <a:solidFill>
                   <a:srgbClr val="333333"/>
                 </a:solidFill>
-                <a:latin typeface="Yu Gothic"/>
+                <a:latin typeface="Meiryo UI"/>
               </a:defRPr>
             </a:pPr>
             <a:r>
@@ -22389,7 +22389,7 @@
                 <a:solidFill>
                   <a:srgbClr val="333333"/>
                 </a:solidFill>
-                <a:latin typeface="Yu Gothic"/>
+                <a:latin typeface="Meiryo UI"/>
               </a:defRPr>
             </a:pPr>
             <a:r>
@@ -22428,7 +22428,7 @@
                 <a:solidFill>
                   <a:srgbClr val="333333"/>
                 </a:solidFill>
-                <a:latin typeface="Yu Gothic"/>
+                <a:latin typeface="Meiryo UI"/>
               </a:defRPr>
             </a:pPr>
             <a:r>
@@ -22467,7 +22467,7 @@
                 <a:solidFill>
                   <a:srgbClr val="333333"/>
                 </a:solidFill>
-                <a:latin typeface="Yu Gothic"/>
+                <a:latin typeface="Meiryo UI"/>
               </a:defRPr>
             </a:pPr>
             <a:r>
@@ -22506,7 +22506,7 @@
                 <a:solidFill>
                   <a:srgbClr val="333333"/>
                 </a:solidFill>
-                <a:latin typeface="Yu Gothic"/>
+                <a:latin typeface="Meiryo UI"/>
               </a:defRPr>
             </a:pPr>
             <a:r>
@@ -22545,7 +22545,7 @@
                 <a:solidFill>
                   <a:srgbClr val="333333"/>
                 </a:solidFill>
-                <a:latin typeface="Yu Gothic"/>
+                <a:latin typeface="Meiryo UI"/>
               </a:defRPr>
             </a:pPr>
             <a:r>
@@ -22584,7 +22584,7 @@
                 <a:solidFill>
                   <a:srgbClr val="333333"/>
                 </a:solidFill>
-                <a:latin typeface="Yu Gothic"/>
+                <a:latin typeface="Meiryo UI"/>
               </a:defRPr>
             </a:pPr>
             <a:r>
@@ -22631,7 +22631,7 @@
                 <a:solidFill>
                   <a:srgbClr val="333333"/>
                 </a:solidFill>
-                <a:latin typeface="Yu Gothic"/>
+                <a:latin typeface="Meiryo UI"/>
               </a:defRPr>
             </a:pPr>
             <a:r>
@@ -22660,7 +22660,7 @@
                 <a:solidFill>
                   <a:srgbClr val="1A1A1A"/>
                 </a:solidFill>
-                <a:latin typeface="Yu Gothic"/>
+                <a:latin typeface="Meiryo UI"/>
               </a:defRPr>
             </a:pPr>
             <a:r>
@@ -22699,7 +22699,7 @@
                 <a:solidFill>
                   <a:srgbClr val="333333"/>
                 </a:solidFill>
-                <a:latin typeface="Yu Gothic"/>
+                <a:latin typeface="Meiryo UI"/>
               </a:defRPr>
             </a:pPr>
             <a:r>
@@ -22715,7 +22715,7 @@
                 <a:solidFill>
                   <a:srgbClr val="333333"/>
                 </a:solidFill>
-                <a:latin typeface="Yu Gothic"/>
+                <a:latin typeface="Meiryo UI"/>
               </a:defRPr>
             </a:pPr>
             <a:r>
@@ -22731,7 +22731,7 @@
                 <a:solidFill>
                   <a:srgbClr val="333333"/>
                 </a:solidFill>
-                <a:latin typeface="Yu Gothic"/>
+                <a:latin typeface="Meiryo UI"/>
               </a:defRPr>
             </a:pPr>
             <a:r>
@@ -22770,7 +22770,7 @@
                 <a:solidFill>
                   <a:srgbClr val="333333"/>
                 </a:solidFill>
-                <a:latin typeface="Yu Gothic"/>
+                <a:latin typeface="Meiryo UI"/>
               </a:defRPr>
             </a:pPr>
             <a:r>
@@ -22786,7 +22786,7 @@
                 <a:solidFill>
                   <a:srgbClr val="333333"/>
                 </a:solidFill>
-                <a:latin typeface="Yu Gothic"/>
+                <a:latin typeface="Meiryo UI"/>
               </a:defRPr>
             </a:pPr>
             <a:r>
@@ -22802,7 +22802,7 @@
                 <a:solidFill>
                   <a:srgbClr val="333333"/>
                 </a:solidFill>
-                <a:latin typeface="Yu Gothic"/>
+                <a:latin typeface="Meiryo UI"/>
               </a:defRPr>
             </a:pPr>
             <a:r>
@@ -22849,7 +22849,7 @@
                 <a:solidFill>
                   <a:srgbClr val="1A1A1A"/>
                 </a:solidFill>
-                <a:latin typeface="Yu Gothic"/>
+                <a:latin typeface="Meiryo UI"/>
               </a:defRPr>
             </a:pPr>
             <a:r>
@@ -22878,7 +22878,7 @@
                 <a:solidFill>
                   <a:srgbClr val="333333"/>
                 </a:solidFill>
-                <a:latin typeface="Yu Gothic"/>
+                <a:latin typeface="Meiryo UI"/>
               </a:defRPr>
             </a:pPr>
             <a:r>
@@ -22949,7 +22949,7 @@
                 <a:solidFill>
                   <a:srgbClr val="333333"/>
                 </a:solidFill>
-                <a:latin typeface="Yu Gothic"/>
+                <a:latin typeface="Meiryo UI"/>
               </a:defRPr>
             </a:pPr>
             <a:r>
@@ -22978,7 +22978,7 @@
                 <a:solidFill>
                   <a:srgbClr val="1A1A1A"/>
                 </a:solidFill>
-                <a:latin typeface="Yu Gothic"/>
+                <a:latin typeface="Meiryo UI"/>
               </a:defRPr>
             </a:pPr>
             <a:r>
@@ -23017,7 +23017,7 @@
                 <a:solidFill>
                   <a:srgbClr val="333333"/>
                 </a:solidFill>
-                <a:latin typeface="Yu Gothic"/>
+                <a:latin typeface="Meiryo UI"/>
               </a:defRPr>
             </a:pPr>
             <a:r>
@@ -23033,7 +23033,7 @@
                 <a:solidFill>
                   <a:srgbClr val="333333"/>
                 </a:solidFill>
-                <a:latin typeface="Yu Gothic"/>
+                <a:latin typeface="Meiryo UI"/>
               </a:defRPr>
             </a:pPr>
             <a:r>
@@ -23049,7 +23049,7 @@
                 <a:solidFill>
                   <a:srgbClr val="333333"/>
                 </a:solidFill>
-                <a:latin typeface="Yu Gothic"/>
+                <a:latin typeface="Meiryo UI"/>
               </a:defRPr>
             </a:pPr>
             <a:r>
@@ -23088,7 +23088,7 @@
                 <a:solidFill>
                   <a:srgbClr val="333333"/>
                 </a:solidFill>
-                <a:latin typeface="Yu Gothic"/>
+                <a:latin typeface="Meiryo UI"/>
               </a:defRPr>
             </a:pPr>
             <a:r>
@@ -23104,7 +23104,7 @@
                 <a:solidFill>
                   <a:srgbClr val="333333"/>
                 </a:solidFill>
-                <a:latin typeface="Yu Gothic"/>
+                <a:latin typeface="Meiryo UI"/>
               </a:defRPr>
             </a:pPr>
             <a:r>
@@ -23120,7 +23120,7 @@
                 <a:solidFill>
                   <a:srgbClr val="333333"/>
                 </a:solidFill>
-                <a:latin typeface="Yu Gothic"/>
+                <a:latin typeface="Meiryo UI"/>
               </a:defRPr>
             </a:pPr>
             <a:r>
@@ -23167,7 +23167,7 @@
                 <a:solidFill>
                   <a:srgbClr val="333333"/>
                 </a:solidFill>
-                <a:latin typeface="Yu Gothic"/>
+                <a:latin typeface="Meiryo UI"/>
               </a:defRPr>
             </a:pPr>
             <a:r>
@@ -23196,7 +23196,7 @@
                 <a:solidFill>
                   <a:srgbClr val="1A1A1A"/>
                 </a:solidFill>
-                <a:latin typeface="Yu Gothic"/>
+                <a:latin typeface="Meiryo UI"/>
               </a:defRPr>
             </a:pPr>
             <a:r>
@@ -23235,7 +23235,7 @@
                 <a:solidFill>
                   <a:srgbClr val="333333"/>
                 </a:solidFill>
-                <a:latin typeface="Yu Gothic"/>
+                <a:latin typeface="Meiryo UI"/>
               </a:defRPr>
             </a:pPr>
             <a:r>
@@ -23251,7 +23251,7 @@
                 <a:solidFill>
                   <a:srgbClr val="333333"/>
                 </a:solidFill>
-                <a:latin typeface="Yu Gothic"/>
+                <a:latin typeface="Meiryo UI"/>
               </a:defRPr>
             </a:pPr>
             <a:r>
@@ -23267,7 +23267,7 @@
                 <a:solidFill>
                   <a:srgbClr val="333333"/>
                 </a:solidFill>
-                <a:latin typeface="Yu Gothic"/>
+                <a:latin typeface="Meiryo UI"/>
               </a:defRPr>
             </a:pPr>
             <a:r>
@@ -23306,7 +23306,7 @@
                 <a:solidFill>
                   <a:srgbClr val="333333"/>
                 </a:solidFill>
-                <a:latin typeface="Yu Gothic"/>
+                <a:latin typeface="Meiryo UI"/>
               </a:defRPr>
             </a:pPr>
             <a:r>
@@ -23322,7 +23322,7 @@
                 <a:solidFill>
                   <a:srgbClr val="333333"/>
                 </a:solidFill>
-                <a:latin typeface="Yu Gothic"/>
+                <a:latin typeface="Meiryo UI"/>
               </a:defRPr>
             </a:pPr>
             <a:r>
@@ -23338,7 +23338,7 @@
                 <a:solidFill>
                   <a:srgbClr val="333333"/>
                 </a:solidFill>
-                <a:latin typeface="Yu Gothic"/>
+                <a:latin typeface="Meiryo UI"/>
               </a:defRPr>
             </a:pPr>
             <a:r>
@@ -23377,7 +23377,7 @@
                 <a:solidFill>
                   <a:srgbClr val="333333"/>
                 </a:solidFill>
-                <a:latin typeface="Yu Gothic"/>
+                <a:latin typeface="Meiryo UI"/>
               </a:defRPr>
             </a:pPr>
             <a:r>
@@ -23393,7 +23393,7 @@
                 <a:solidFill>
                   <a:srgbClr val="333333"/>
                 </a:solidFill>
-                <a:latin typeface="Yu Gothic"/>
+                <a:latin typeface="Meiryo UI"/>
               </a:defRPr>
             </a:pPr>
             <a:r>
@@ -23409,7 +23409,7 @@
                 <a:solidFill>
                   <a:srgbClr val="333333"/>
                 </a:solidFill>
-                <a:latin typeface="Yu Gothic"/>
+                <a:latin typeface="Meiryo UI"/>
               </a:defRPr>
             </a:pPr>
             <a:r>
@@ -23456,7 +23456,7 @@
                 <a:solidFill>
                   <a:srgbClr val="333333"/>
                 </a:solidFill>
-                <a:latin typeface="Yu Gothic"/>
+                <a:latin typeface="Meiryo UI"/>
               </a:defRPr>
             </a:pPr>
             <a:r>
@@ -23485,7 +23485,7 @@
                 <a:solidFill>
                   <a:srgbClr val="1A1A1A"/>
                 </a:solidFill>
-                <a:latin typeface="Yu Gothic"/>
+                <a:latin typeface="Meiryo UI"/>
               </a:defRPr>
             </a:pPr>
             <a:r>
@@ -23524,7 +23524,7 @@
                 <a:solidFill>
                   <a:srgbClr val="333333"/>
                 </a:solidFill>
-                <a:latin typeface="Yu Gothic"/>
+                <a:latin typeface="Meiryo UI"/>
               </a:defRPr>
             </a:pPr>
             <a:r>
@@ -23540,7 +23540,7 @@
                 <a:solidFill>
                   <a:srgbClr val="333333"/>
                 </a:solidFill>
-                <a:latin typeface="Yu Gothic"/>
+                <a:latin typeface="Meiryo UI"/>
               </a:defRPr>
             </a:pPr>
             <a:r>
@@ -23556,7 +23556,7 @@
                 <a:solidFill>
                   <a:srgbClr val="333333"/>
                 </a:solidFill>
-                <a:latin typeface="Yu Gothic"/>
+                <a:latin typeface="Meiryo UI"/>
               </a:defRPr>
             </a:pPr>
             <a:r>
@@ -23595,7 +23595,7 @@
                 <a:solidFill>
                   <a:srgbClr val="333333"/>
                 </a:solidFill>
-                <a:latin typeface="Yu Gothic"/>
+                <a:latin typeface="Meiryo UI"/>
               </a:defRPr>
             </a:pPr>
             <a:r>
@@ -23611,7 +23611,7 @@
                 <a:solidFill>
                   <a:srgbClr val="333333"/>
                 </a:solidFill>
-                <a:latin typeface="Yu Gothic"/>
+                <a:latin typeface="Meiryo UI"/>
               </a:defRPr>
             </a:pPr>
             <a:r>
@@ -23627,7 +23627,7 @@
                 <a:solidFill>
                   <a:srgbClr val="333333"/>
                 </a:solidFill>
-                <a:latin typeface="Yu Gothic"/>
+                <a:latin typeface="Meiryo UI"/>
               </a:defRPr>
             </a:pPr>
             <a:r>
@@ -23666,7 +23666,7 @@
                 <a:solidFill>
                   <a:srgbClr val="333333"/>
                 </a:solidFill>
-                <a:latin typeface="Yu Gothic"/>
+                <a:latin typeface="Meiryo UI"/>
               </a:defRPr>
             </a:pPr>
             <a:r>
@@ -23682,7 +23682,7 @@
                 <a:solidFill>
                   <a:srgbClr val="333333"/>
                 </a:solidFill>
-                <a:latin typeface="Yu Gothic"/>
+                <a:latin typeface="Meiryo UI"/>
               </a:defRPr>
             </a:pPr>
             <a:r>
@@ -23698,7 +23698,7 @@
                 <a:solidFill>
                   <a:srgbClr val="333333"/>
                 </a:solidFill>
-                <a:latin typeface="Yu Gothic"/>
+                <a:latin typeface="Meiryo UI"/>
               </a:defRPr>
             </a:pPr>
             <a:r>
@@ -23745,7 +23745,7 @@
                 <a:solidFill>
                   <a:srgbClr val="333333"/>
                 </a:solidFill>
-                <a:latin typeface="Yu Gothic"/>
+                <a:latin typeface="Meiryo UI"/>
               </a:defRPr>
             </a:pPr>
             <a:r>
@@ -23774,7 +23774,7 @@
                 <a:solidFill>
                   <a:srgbClr val="1A1A1A"/>
                 </a:solidFill>
-                <a:latin typeface="Yu Gothic"/>
+                <a:latin typeface="Meiryo UI"/>
               </a:defRPr>
             </a:pPr>
             <a:r>
@@ -23813,7 +23813,7 @@
                 <a:solidFill>
                   <a:srgbClr val="333333"/>
                 </a:solidFill>
-                <a:latin typeface="Yu Gothic"/>
+                <a:latin typeface="Meiryo UI"/>
               </a:defRPr>
             </a:pPr>
             <a:r>
@@ -23829,7 +23829,7 @@
                 <a:solidFill>
                   <a:srgbClr val="333333"/>
                 </a:solidFill>
-                <a:latin typeface="Yu Gothic"/>
+                <a:latin typeface="Meiryo UI"/>
               </a:defRPr>
             </a:pPr>
             <a:r>
@@ -23845,7 +23845,7 @@
                 <a:solidFill>
                   <a:srgbClr val="333333"/>
                 </a:solidFill>
-                <a:latin typeface="Yu Gothic"/>
+                <a:latin typeface="Meiryo UI"/>
               </a:defRPr>
             </a:pPr>
             <a:r>
@@ -23884,7 +23884,7 @@
                 <a:solidFill>
                   <a:srgbClr val="333333"/>
                 </a:solidFill>
-                <a:latin typeface="Yu Gothic"/>
+                <a:latin typeface="Meiryo UI"/>
               </a:defRPr>
             </a:pPr>
             <a:r>
@@ -23900,7 +23900,7 @@
                 <a:solidFill>
                   <a:srgbClr val="333333"/>
                 </a:solidFill>
-                <a:latin typeface="Yu Gothic"/>
+                <a:latin typeface="Meiryo UI"/>
               </a:defRPr>
             </a:pPr>
             <a:r>
@@ -23916,7 +23916,7 @@
                 <a:solidFill>
                   <a:srgbClr val="333333"/>
                 </a:solidFill>
-                <a:latin typeface="Yu Gothic"/>
+                <a:latin typeface="Meiryo UI"/>
               </a:defRPr>
             </a:pPr>
             <a:r>
@@ -23955,7 +23955,7 @@
                 <a:solidFill>
                   <a:srgbClr val="333333"/>
                 </a:solidFill>
-                <a:latin typeface="Yu Gothic"/>
+                <a:latin typeface="Meiryo UI"/>
               </a:defRPr>
             </a:pPr>
             <a:r>
@@ -23971,7 +23971,7 @@
                 <a:solidFill>
                   <a:srgbClr val="333333"/>
                 </a:solidFill>
-                <a:latin typeface="Yu Gothic"/>
+                <a:latin typeface="Meiryo UI"/>
               </a:defRPr>
             </a:pPr>
             <a:r>
@@ -23987,7 +23987,7 @@
                 <a:solidFill>
                   <a:srgbClr val="333333"/>
                 </a:solidFill>
-                <a:latin typeface="Yu Gothic"/>
+                <a:latin typeface="Meiryo UI"/>
               </a:defRPr>
             </a:pPr>
             <a:r>
@@ -24026,7 +24026,7 @@
                 <a:solidFill>
                   <a:srgbClr val="333333"/>
                 </a:solidFill>
-                <a:latin typeface="Yu Gothic"/>
+                <a:latin typeface="Meiryo UI"/>
               </a:defRPr>
             </a:pPr>
             <a:r>
@@ -24042,7 +24042,7 @@
                 <a:solidFill>
                   <a:srgbClr val="333333"/>
                 </a:solidFill>
-                <a:latin typeface="Yu Gothic"/>
+                <a:latin typeface="Meiryo UI"/>
               </a:defRPr>
             </a:pPr>
             <a:r>
@@ -24058,7 +24058,7 @@
                 <a:solidFill>
                   <a:srgbClr val="333333"/>
                 </a:solidFill>
-                <a:latin typeface="Yu Gothic"/>
+                <a:latin typeface="Meiryo UI"/>
               </a:defRPr>
             </a:pPr>
             <a:r>
@@ -24105,7 +24105,7 @@
                 <a:solidFill>
                   <a:srgbClr val="333333"/>
                 </a:solidFill>
-                <a:latin typeface="Yu Gothic"/>
+                <a:latin typeface="Meiryo UI"/>
               </a:defRPr>
             </a:pPr>
             <a:r>
@@ -24134,7 +24134,7 @@
                 <a:solidFill>
                   <a:srgbClr val="1A1A1A"/>
                 </a:solidFill>
-                <a:latin typeface="Yu Gothic"/>
+                <a:latin typeface="Meiryo UI"/>
               </a:defRPr>
             </a:pPr>
             <a:r>
@@ -24173,7 +24173,7 @@
                 <a:solidFill>
                   <a:srgbClr val="333333"/>
                 </a:solidFill>
-                <a:latin typeface="Yu Gothic"/>
+                <a:latin typeface="Meiryo UI"/>
               </a:defRPr>
             </a:pPr>
             <a:r>
@@ -24189,7 +24189,7 @@
                 <a:solidFill>
                   <a:srgbClr val="333333"/>
                 </a:solidFill>
-                <a:latin typeface="Yu Gothic"/>
+                <a:latin typeface="Meiryo UI"/>
               </a:defRPr>
             </a:pPr>
             <a:r>
@@ -24205,7 +24205,7 @@
                 <a:solidFill>
                   <a:srgbClr val="333333"/>
                 </a:solidFill>
-                <a:latin typeface="Yu Gothic"/>
+                <a:latin typeface="Meiryo UI"/>
               </a:defRPr>
             </a:pPr>
             <a:r>
@@ -24244,7 +24244,7 @@
                 <a:solidFill>
                   <a:srgbClr val="333333"/>
                 </a:solidFill>
-                <a:latin typeface="Yu Gothic"/>
+                <a:latin typeface="Meiryo UI"/>
               </a:defRPr>
             </a:pPr>
             <a:r>
@@ -24260,7 +24260,7 @@
                 <a:solidFill>
                   <a:srgbClr val="333333"/>
                 </a:solidFill>
-                <a:latin typeface="Yu Gothic"/>
+                <a:latin typeface="Meiryo UI"/>
               </a:defRPr>
             </a:pPr>
             <a:r>
@@ -24276,7 +24276,7 @@
                 <a:solidFill>
                   <a:srgbClr val="333333"/>
                 </a:solidFill>
-                <a:latin typeface="Yu Gothic"/>
+                <a:latin typeface="Meiryo UI"/>
               </a:defRPr>
             </a:pPr>
             <a:r>
@@ -24315,7 +24315,7 @@
                 <a:solidFill>
                   <a:srgbClr val="333333"/>
                 </a:solidFill>
-                <a:latin typeface="Yu Gothic"/>
+                <a:latin typeface="Meiryo UI"/>
               </a:defRPr>
             </a:pPr>
             <a:r>
@@ -24331,7 +24331,7 @@
                 <a:solidFill>
                   <a:srgbClr val="333333"/>
                 </a:solidFill>
-                <a:latin typeface="Yu Gothic"/>
+                <a:latin typeface="Meiryo UI"/>
               </a:defRPr>
             </a:pPr>
             <a:r>
@@ -24347,7 +24347,7 @@
                 <a:solidFill>
                   <a:srgbClr val="333333"/>
                 </a:solidFill>
-                <a:latin typeface="Yu Gothic"/>
+                <a:latin typeface="Meiryo UI"/>
               </a:defRPr>
             </a:pPr>
             <a:r>
@@ -24386,7 +24386,7 @@
                 <a:solidFill>
                   <a:srgbClr val="333333"/>
                 </a:solidFill>
-                <a:latin typeface="Yu Gothic"/>
+                <a:latin typeface="Meiryo UI"/>
               </a:defRPr>
             </a:pPr>
             <a:r>
@@ -24402,7 +24402,7 @@
                 <a:solidFill>
                   <a:srgbClr val="333333"/>
                 </a:solidFill>
-                <a:latin typeface="Yu Gothic"/>
+                <a:latin typeface="Meiryo UI"/>
               </a:defRPr>
             </a:pPr>
             <a:r>
@@ -24418,7 +24418,7 @@
                 <a:solidFill>
                   <a:srgbClr val="333333"/>
                 </a:solidFill>
-                <a:latin typeface="Yu Gothic"/>
+                <a:latin typeface="Meiryo UI"/>
               </a:defRPr>
             </a:pPr>
             <a:r>
@@ -24465,7 +24465,7 @@
                 <a:solidFill>
                   <a:srgbClr val="333333"/>
                 </a:solidFill>
-                <a:latin typeface="Yu Gothic"/>
+                <a:latin typeface="Meiryo UI"/>
               </a:defRPr>
             </a:pPr>
             <a:r>
@@ -24494,7 +24494,7 @@
                 <a:solidFill>
                   <a:srgbClr val="1A1A1A"/>
                 </a:solidFill>
-                <a:latin typeface="Yu Gothic"/>
+                <a:latin typeface="Meiryo UI"/>
               </a:defRPr>
             </a:pPr>
             <a:r>
@@ -24533,7 +24533,7 @@
                 <a:solidFill>
                   <a:srgbClr val="333333"/>
                 </a:solidFill>
-                <a:latin typeface="Yu Gothic"/>
+                <a:latin typeface="Meiryo UI"/>
               </a:defRPr>
             </a:pPr>
             <a:r>
@@ -24580,7 +24580,7 @@
                 <a:solidFill>
                   <a:srgbClr val="333333"/>
                 </a:solidFill>
-                <a:latin typeface="Yu Gothic"/>
+                <a:latin typeface="Meiryo UI"/>
               </a:defRPr>
             </a:pPr>
             <a:r>
@@ -24609,7 +24609,7 @@
                 <a:solidFill>
                   <a:srgbClr val="1A1A1A"/>
                 </a:solidFill>
-                <a:latin typeface="Yu Gothic"/>
+                <a:latin typeface="Meiryo UI"/>
               </a:defRPr>
             </a:pPr>
             <a:r>
@@ -24648,7 +24648,7 @@
                 <a:solidFill>
                   <a:srgbClr val="333333"/>
                 </a:solidFill>
-                <a:latin typeface="Yu Gothic"/>
+                <a:latin typeface="Meiryo UI"/>
               </a:defRPr>
             </a:pPr>
             <a:r>
@@ -24702,7 +24702,7 @@
                 <a:solidFill>
                   <a:srgbClr val="1A1A1A"/>
                 </a:solidFill>
-                <a:latin typeface="Yu Gothic"/>
+                <a:latin typeface="Meiryo UI"/>
               </a:defRPr>
             </a:pPr>
             <a:r>
@@ -24780,7 +24780,7 @@
                 <a:solidFill>
                   <a:srgbClr val="1A1A1A"/>
                 </a:solidFill>
-                <a:latin typeface="Yu Gothic"/>
+                <a:latin typeface="Meiryo UI"/>
               </a:defRPr>
             </a:pPr>
             <a:r>
@@ -24851,7 +24851,7 @@
                 <a:solidFill>
                   <a:srgbClr val="1A1A1A"/>
                 </a:solidFill>
-                <a:latin typeface="Yu Gothic"/>
+                <a:latin typeface="Meiryo UI"/>
               </a:defRPr>
             </a:pPr>
             <a:r>
@@ -24880,7 +24880,7 @@
                 <a:solidFill>
                   <a:srgbClr val="333333"/>
                 </a:solidFill>
-                <a:latin typeface="Yu Gothic"/>
+                <a:latin typeface="Meiryo UI"/>
               </a:defRPr>
             </a:pPr>
             <a:r>
@@ -24936,7 +24936,7 @@
                 <a:solidFill>
                   <a:srgbClr val="333333"/>
                 </a:solidFill>
-                <a:latin typeface="Yu Gothic"/>
+                <a:latin typeface="Meiryo UI"/>
               </a:defRPr>
             </a:pPr>
             <a:r>
@@ -24983,7 +24983,7 @@
                 <a:solidFill>
                   <a:srgbClr val="1A1A1A"/>
                 </a:solidFill>
-                <a:latin typeface="Yu Gothic"/>
+                <a:latin typeface="Meiryo UI"/>
               </a:defRPr>
             </a:pPr>
             <a:r>
@@ -25012,7 +25012,7 @@
                 <a:solidFill>
                   <a:srgbClr val="333333"/>
                 </a:solidFill>
-                <a:latin typeface="Yu Gothic"/>
+                <a:latin typeface="Meiryo UI"/>
               </a:defRPr>
             </a:pPr>
             <a:r>
@@ -25083,7 +25083,7 @@
                 <a:solidFill>
                   <a:srgbClr val="1A1A1A"/>
                 </a:solidFill>
-                <a:latin typeface="Yu Gothic"/>
+                <a:latin typeface="Meiryo UI"/>
               </a:defRPr>
             </a:pPr>
             <a:r>
@@ -25112,7 +25112,7 @@
                 <a:solidFill>
                   <a:srgbClr val="333333"/>
                 </a:solidFill>
-                <a:latin typeface="Yu Gothic"/>
+                <a:latin typeface="Meiryo UI"/>
               </a:defRPr>
             </a:pPr>
             <a:r>
@@ -25168,7 +25168,7 @@
                 <a:solidFill>
                   <a:srgbClr val="333333"/>
                 </a:solidFill>
-                <a:latin typeface="Yu Gothic"/>
+                <a:latin typeface="Meiryo UI"/>
               </a:defRPr>
             </a:pPr>
             <a:r>
@@ -25215,7 +25215,7 @@
                 <a:solidFill>
                   <a:srgbClr val="1A1A1A"/>
                 </a:solidFill>
-                <a:latin typeface="Yu Gothic"/>
+                <a:latin typeface="Meiryo UI"/>
               </a:defRPr>
             </a:pPr>
             <a:r>
@@ -25244,7 +25244,7 @@
                 <a:solidFill>
                   <a:srgbClr val="333333"/>
                 </a:solidFill>
-                <a:latin typeface="Yu Gothic"/>
+                <a:latin typeface="Meiryo UI"/>
               </a:defRPr>
             </a:pPr>
             <a:r>
@@ -25315,7 +25315,7 @@
                 <a:solidFill>
                   <a:srgbClr val="333333"/>
                 </a:solidFill>
-                <a:latin typeface="Yu Gothic"/>
+                <a:latin typeface="Meiryo UI"/>
               </a:defRPr>
             </a:pPr>
             <a:r>
@@ -25354,7 +25354,7 @@
                 <a:solidFill>
                   <a:srgbClr val="333333"/>
                 </a:solidFill>
-                <a:latin typeface="Yu Gothic"/>
+                <a:latin typeface="Meiryo UI"/>
               </a:defRPr>
             </a:pPr>
             <a:r>
@@ -25370,7 +25370,7 @@
                 <a:solidFill>
                   <a:srgbClr val="333333"/>
                 </a:solidFill>
-                <a:latin typeface="Yu Gothic"/>
+                <a:latin typeface="Meiryo UI"/>
               </a:defRPr>
             </a:pPr>
             <a:r>
@@ -25441,7 +25441,7 @@
                 <a:solidFill>
                   <a:srgbClr val="333333"/>
                 </a:solidFill>
-                <a:latin typeface="Yu Gothic"/>
+                <a:latin typeface="Meiryo UI"/>
               </a:defRPr>
             </a:pPr>
             <a:r>
@@ -25480,7 +25480,7 @@
                 <a:solidFill>
                   <a:srgbClr val="333333"/>
                 </a:solidFill>
-                <a:latin typeface="Yu Gothic"/>
+                <a:latin typeface="Meiryo UI"/>
               </a:defRPr>
             </a:pPr>
             <a:r>
@@ -25496,7 +25496,7 @@
                 <a:solidFill>
                   <a:srgbClr val="333333"/>
                 </a:solidFill>
-                <a:latin typeface="Yu Gothic"/>
+                <a:latin typeface="Meiryo UI"/>
               </a:defRPr>
             </a:pPr>
             <a:r>
@@ -25567,7 +25567,7 @@
                 <a:solidFill>
                   <a:srgbClr val="1A1A1A"/>
                 </a:solidFill>
-                <a:latin typeface="Yu Gothic"/>
+                <a:latin typeface="Meiryo UI"/>
               </a:defRPr>
             </a:pPr>
             <a:r>
@@ -25596,7 +25596,7 @@
                 <a:solidFill>
                   <a:srgbClr val="333333"/>
                 </a:solidFill>
-                <a:latin typeface="Yu Gothic"/>
+                <a:latin typeface="Meiryo UI"/>
               </a:defRPr>
             </a:pPr>
             <a:r>
@@ -25635,7 +25635,7 @@
                 <a:solidFill>
                   <a:srgbClr val="333333"/>
                 </a:solidFill>
-                <a:latin typeface="Yu Gothic"/>
+                <a:latin typeface="Meiryo UI"/>
               </a:defRPr>
             </a:pPr>
             <a:r>

</xml_diff>